<commit_message>
Finalized presentation and pipeline
</commit_message>
<xml_diff>
--- a/presentation/Prague-2020-working-with-zip.pptx
+++ b/presentation/Prague-2020-working-with-zip.pptx
@@ -4260,6 +4260,87 @@
           </a:p>
         </p:txBody>
       </p:sp>
+      <p:sp>
+        <p:nvSpPr>
+          <p:cNvPr id="7" name="TextBox 6">
+            <a:extLst>
+              <a:ext uri="{FF2B5EF4-FFF2-40B4-BE49-F238E27FC236}">
+                <a16:creationId xmlns:a16="http://schemas.microsoft.com/office/drawing/2014/main" id="{92A47E9A-066E-4339-8724-20BC6B077D1A}"/>
+              </a:ext>
+            </a:extLst>
+          </p:cNvPr>
+          <p:cNvSpPr txBox="1"/>
+          <p:nvPr/>
+        </p:nvSpPr>
+        <p:spPr>
+          <a:xfrm>
+            <a:off x="137759" y="6217155"/>
+            <a:ext cx="10016314" cy="400110"/>
+          </a:xfrm>
+          <a:prstGeom prst="rect">
+            <a:avLst/>
+          </a:prstGeom>
+          <a:noFill/>
+        </p:spPr>
+        <p:txBody>
+          <a:bodyPr wrap="square" rtlCol="0">
+            <a:spAutoFit/>
+          </a:bodyPr>
+          <a:lstStyle/>
+          <a:p>
+            <a:r>
+              <a:rPr lang="en-US" sz="2000" dirty="0"/>
+              <a:t>Source &amp; presentation: </a:t>
+            </a:r>
+            <a:r>
+              <a:rPr lang="en-GB" sz="2000" dirty="0">
+                <a:hlinkClick r:id="rId4"/>
+              </a:rPr>
+              <a:t>https://github.com/xatapult/working-with-zip-demo-prague-2020</a:t>
+            </a:r>
+            <a:r>
+              <a:rPr lang="en-GB" sz="2000" dirty="0"/>
+              <a:t> </a:t>
+            </a:r>
+          </a:p>
+        </p:txBody>
+      </p:sp>
+      <p:pic>
+        <p:nvPicPr>
+          <p:cNvPr id="9" name="Picture 8" descr="A close up of a logo&#10;&#10;Description automatically generated">
+            <a:extLst>
+              <a:ext uri="{FF2B5EF4-FFF2-40B4-BE49-F238E27FC236}">
+                <a16:creationId xmlns:a16="http://schemas.microsoft.com/office/drawing/2014/main" id="{2722BF6B-E622-4F61-A670-032570FA0C51}"/>
+              </a:ext>
+            </a:extLst>
+          </p:cNvPr>
+          <p:cNvPicPr>
+            <a:picLocks noChangeAspect="1"/>
+          </p:cNvPicPr>
+          <p:nvPr/>
+        </p:nvPicPr>
+        <p:blipFill>
+          <a:blip r:embed="rId5">
+            <a:extLst>
+              <a:ext uri="{28A0092B-C50C-407E-A947-70E740481C1C}">
+                <a14:useLocalDpi xmlns:a14="http://schemas.microsoft.com/office/drawing/2010/main" val="0"/>
+              </a:ext>
+            </a:extLst>
+          </a:blip>
+          <a:stretch>
+            <a:fillRect/>
+          </a:stretch>
+        </p:blipFill>
+        <p:spPr>
+          <a:xfrm>
+            <a:off x="10622012" y="6266048"/>
+            <a:ext cx="1295196" cy="400110"/>
+          </a:xfrm>
+          <a:prstGeom prst="rect">
+            <a:avLst/>
+          </a:prstGeom>
+        </p:spPr>
+      </p:pic>
     </p:spTree>
     <p:extLst>
       <p:ext uri="{BB962C8B-B14F-4D97-AF65-F5344CB8AC3E}">
@@ -5254,6 +5335,108 @@
           </a:p>
         </p:txBody>
       </p:sp>
+      <p:sp>
+        <p:nvSpPr>
+          <p:cNvPr id="9" name="Oval 8">
+            <a:extLst>
+              <a:ext uri="{FF2B5EF4-FFF2-40B4-BE49-F238E27FC236}">
+                <a16:creationId xmlns:a16="http://schemas.microsoft.com/office/drawing/2014/main" id="{A1CE6C11-D39D-44F5-A8CB-C5E028871472}"/>
+              </a:ext>
+            </a:extLst>
+          </p:cNvPr>
+          <p:cNvSpPr/>
+          <p:nvPr/>
+        </p:nvSpPr>
+        <p:spPr>
+          <a:xfrm>
+            <a:off x="5613362" y="2460081"/>
+            <a:ext cx="5887418" cy="1113348"/>
+          </a:xfrm>
+          <a:prstGeom prst="ellipse">
+            <a:avLst/>
+          </a:prstGeom>
+          <a:solidFill>
+            <a:schemeClr val="accent2">
+              <a:alpha val="31000"/>
+            </a:schemeClr>
+          </a:solidFill>
+        </p:spPr>
+        <p:style>
+          <a:lnRef idx="2">
+            <a:schemeClr val="accent1">
+              <a:shade val="50000"/>
+            </a:schemeClr>
+          </a:lnRef>
+          <a:fillRef idx="1">
+            <a:schemeClr val="accent1"/>
+          </a:fillRef>
+          <a:effectRef idx="0">
+            <a:schemeClr val="accent1"/>
+          </a:effectRef>
+          <a:fontRef idx="minor">
+            <a:schemeClr val="lt1"/>
+          </a:fontRef>
+        </p:style>
+        <p:txBody>
+          <a:bodyPr rtlCol="0" anchor="ctr"/>
+          <a:lstStyle/>
+          <a:p>
+            <a:pPr algn="ctr"/>
+            <a:endParaRPr lang="en-GB"/>
+          </a:p>
+        </p:txBody>
+      </p:sp>
+      <p:sp>
+        <p:nvSpPr>
+          <p:cNvPr id="11" name="Oval 10">
+            <a:extLst>
+              <a:ext uri="{FF2B5EF4-FFF2-40B4-BE49-F238E27FC236}">
+                <a16:creationId xmlns:a16="http://schemas.microsoft.com/office/drawing/2014/main" id="{BD431CE8-EF60-410D-B019-B45A2ECB3733}"/>
+              </a:ext>
+            </a:extLst>
+          </p:cNvPr>
+          <p:cNvSpPr/>
+          <p:nvPr/>
+        </p:nvSpPr>
+        <p:spPr>
+          <a:xfrm>
+            <a:off x="905526" y="2179186"/>
+            <a:ext cx="1658892" cy="525755"/>
+          </a:xfrm>
+          <a:prstGeom prst="ellipse">
+            <a:avLst/>
+          </a:prstGeom>
+          <a:solidFill>
+            <a:schemeClr val="accent2">
+              <a:alpha val="31000"/>
+            </a:schemeClr>
+          </a:solidFill>
+        </p:spPr>
+        <p:style>
+          <a:lnRef idx="2">
+            <a:schemeClr val="accent1">
+              <a:shade val="50000"/>
+            </a:schemeClr>
+          </a:lnRef>
+          <a:fillRef idx="1">
+            <a:schemeClr val="accent1"/>
+          </a:fillRef>
+          <a:effectRef idx="0">
+            <a:schemeClr val="accent1"/>
+          </a:effectRef>
+          <a:fontRef idx="minor">
+            <a:schemeClr val="lt1"/>
+          </a:fontRef>
+        </p:style>
+        <p:txBody>
+          <a:bodyPr rtlCol="0" anchor="ctr"/>
+          <a:lstStyle/>
+          <a:p>
+            <a:pPr algn="ctr"/>
+            <a:endParaRPr lang="en-GB"/>
+          </a:p>
+        </p:txBody>
+      </p:sp>
     </p:spTree>
     <p:extLst>
       <p:ext uri="{BB962C8B-B14F-4D97-AF65-F5344CB8AC3E}">
@@ -5264,6 +5447,130 @@
   <p:clrMapOvr>
     <a:masterClrMapping/>
   </p:clrMapOvr>
+  <p:timing>
+    <p:tnLst>
+      <p:par>
+        <p:cTn id="1" dur="indefinite" restart="never" nodeType="tmRoot">
+          <p:childTnLst>
+            <p:seq concurrent="1" nextAc="seek">
+              <p:cTn id="2" dur="indefinite" nodeType="mainSeq">
+                <p:childTnLst>
+                  <p:par>
+                    <p:cTn id="3" fill="hold">
+                      <p:stCondLst>
+                        <p:cond delay="indefinite"/>
+                      </p:stCondLst>
+                      <p:childTnLst>
+                        <p:par>
+                          <p:cTn id="4" fill="hold">
+                            <p:stCondLst>
+                              <p:cond delay="0"/>
+                            </p:stCondLst>
+                            <p:childTnLst>
+                              <p:par>
+                                <p:cTn id="5" presetID="1" presetClass="entr" presetSubtype="0" fill="hold" grpId="0" nodeType="clickEffect">
+                                  <p:stCondLst>
+                                    <p:cond delay="0"/>
+                                  </p:stCondLst>
+                                  <p:childTnLst>
+                                    <p:set>
+                                      <p:cBhvr>
+                                        <p:cTn id="6" dur="1" fill="hold">
+                                          <p:stCondLst>
+                                            <p:cond delay="0"/>
+                                          </p:stCondLst>
+                                        </p:cTn>
+                                        <p:tgtEl>
+                                          <p:spTgt spid="9"/>
+                                        </p:tgtEl>
+                                        <p:attrNameLst>
+                                          <p:attrName>style.visibility</p:attrName>
+                                        </p:attrNameLst>
+                                      </p:cBhvr>
+                                      <p:to>
+                                        <p:strVal val="visible"/>
+                                      </p:to>
+                                    </p:set>
+                                  </p:childTnLst>
+                                </p:cTn>
+                              </p:par>
+                            </p:childTnLst>
+                          </p:cTn>
+                        </p:par>
+                      </p:childTnLst>
+                    </p:cTn>
+                  </p:par>
+                  <p:par>
+                    <p:cTn id="7" fill="hold">
+                      <p:stCondLst>
+                        <p:cond delay="indefinite"/>
+                      </p:stCondLst>
+                      <p:childTnLst>
+                        <p:par>
+                          <p:cTn id="8" fill="hold">
+                            <p:stCondLst>
+                              <p:cond delay="0"/>
+                            </p:stCondLst>
+                            <p:childTnLst>
+                              <p:par>
+                                <p:cTn id="9" presetID="1" presetClass="entr" presetSubtype="0" fill="hold" grpId="0" nodeType="clickEffect">
+                                  <p:stCondLst>
+                                    <p:cond delay="0"/>
+                                  </p:stCondLst>
+                                  <p:childTnLst>
+                                    <p:set>
+                                      <p:cBhvr>
+                                        <p:cTn id="10" dur="1" fill="hold">
+                                          <p:stCondLst>
+                                            <p:cond delay="0"/>
+                                          </p:stCondLst>
+                                        </p:cTn>
+                                        <p:tgtEl>
+                                          <p:spTgt spid="11"/>
+                                        </p:tgtEl>
+                                        <p:attrNameLst>
+                                          <p:attrName>style.visibility</p:attrName>
+                                        </p:attrNameLst>
+                                      </p:cBhvr>
+                                      <p:to>
+                                        <p:strVal val="visible"/>
+                                      </p:to>
+                                    </p:set>
+                                  </p:childTnLst>
+                                </p:cTn>
+                              </p:par>
+                            </p:childTnLst>
+                          </p:cTn>
+                        </p:par>
+                      </p:childTnLst>
+                    </p:cTn>
+                  </p:par>
+                </p:childTnLst>
+              </p:cTn>
+              <p:prevCondLst>
+                <p:cond evt="onPrev" delay="0">
+                  <p:tgtEl>
+                    <p:sldTgt/>
+                  </p:tgtEl>
+                </p:cond>
+              </p:prevCondLst>
+              <p:nextCondLst>
+                <p:cond evt="onNext" delay="0">
+                  <p:tgtEl>
+                    <p:sldTgt/>
+                  </p:tgtEl>
+                </p:cond>
+              </p:nextCondLst>
+            </p:seq>
+          </p:childTnLst>
+        </p:cTn>
+      </p:par>
+    </p:tnLst>
+    <p:bldLst>
+      <p:bldP spid="9" grpId="0" animBg="1"/>
+      <p:bldP spid="11" grpId="0" animBg="1"/>
+    </p:bldLst>
+  </p:timing>
 </p:sld>
 </file>
 
@@ -6018,6 +6325,295 @@
   <p:clrMapOvr>
     <a:masterClrMapping/>
   </p:clrMapOvr>
+  <p:timing>
+    <p:tnLst>
+      <p:par>
+        <p:cTn id="1" dur="indefinite" restart="never" nodeType="tmRoot">
+          <p:childTnLst>
+            <p:seq concurrent="1" nextAc="seek">
+              <p:cTn id="2" dur="indefinite" nodeType="mainSeq">
+                <p:childTnLst>
+                  <p:par>
+                    <p:cTn id="3" fill="hold">
+                      <p:stCondLst>
+                        <p:cond delay="indefinite"/>
+                      </p:stCondLst>
+                      <p:childTnLst>
+                        <p:par>
+                          <p:cTn id="4" fill="hold">
+                            <p:stCondLst>
+                              <p:cond delay="0"/>
+                            </p:stCondLst>
+                            <p:childTnLst>
+                              <p:par>
+                                <p:cTn id="5" presetID="1" presetClass="entr" presetSubtype="0" fill="hold" nodeType="clickEffect">
+                                  <p:stCondLst>
+                                    <p:cond delay="0"/>
+                                  </p:stCondLst>
+                                  <p:childTnLst>
+                                    <p:set>
+                                      <p:cBhvr>
+                                        <p:cTn id="6" dur="1" fill="hold">
+                                          <p:stCondLst>
+                                            <p:cond delay="0"/>
+                                          </p:stCondLst>
+                                        </p:cTn>
+                                        <p:tgtEl>
+                                          <p:spTgt spid="20"/>
+                                        </p:tgtEl>
+                                        <p:attrNameLst>
+                                          <p:attrName>style.visibility</p:attrName>
+                                        </p:attrNameLst>
+                                      </p:cBhvr>
+                                      <p:to>
+                                        <p:strVal val="visible"/>
+                                      </p:to>
+                                    </p:set>
+                                  </p:childTnLst>
+                                </p:cTn>
+                              </p:par>
+                              <p:par>
+                                <p:cTn id="7" presetID="1" presetClass="entr" presetSubtype="0" fill="hold" grpId="0" nodeType="withEffect">
+                                  <p:stCondLst>
+                                    <p:cond delay="0"/>
+                                  </p:stCondLst>
+                                  <p:childTnLst>
+                                    <p:set>
+                                      <p:cBhvr>
+                                        <p:cTn id="8" dur="1" fill="hold">
+                                          <p:stCondLst>
+                                            <p:cond delay="0"/>
+                                          </p:stCondLst>
+                                        </p:cTn>
+                                        <p:tgtEl>
+                                          <p:spTgt spid="11"/>
+                                        </p:tgtEl>
+                                        <p:attrNameLst>
+                                          <p:attrName>style.visibility</p:attrName>
+                                        </p:attrNameLst>
+                                      </p:cBhvr>
+                                      <p:to>
+                                        <p:strVal val="visible"/>
+                                      </p:to>
+                                    </p:set>
+                                  </p:childTnLst>
+                                </p:cTn>
+                              </p:par>
+                            </p:childTnLst>
+                          </p:cTn>
+                        </p:par>
+                      </p:childTnLst>
+                    </p:cTn>
+                  </p:par>
+                  <p:par>
+                    <p:cTn id="9" fill="hold">
+                      <p:stCondLst>
+                        <p:cond delay="indefinite"/>
+                      </p:stCondLst>
+                      <p:childTnLst>
+                        <p:par>
+                          <p:cTn id="10" fill="hold">
+                            <p:stCondLst>
+                              <p:cond delay="0"/>
+                            </p:stCondLst>
+                            <p:childTnLst>
+                              <p:par>
+                                <p:cTn id="11" presetID="1" presetClass="entr" presetSubtype="0" fill="hold" grpId="0" nodeType="clickEffect">
+                                  <p:stCondLst>
+                                    <p:cond delay="0"/>
+                                  </p:stCondLst>
+                                  <p:childTnLst>
+                                    <p:set>
+                                      <p:cBhvr>
+                                        <p:cTn id="12" dur="1" fill="hold">
+                                          <p:stCondLst>
+                                            <p:cond delay="0"/>
+                                          </p:stCondLst>
+                                        </p:cTn>
+                                        <p:tgtEl>
+                                          <p:spTgt spid="12"/>
+                                        </p:tgtEl>
+                                        <p:attrNameLst>
+                                          <p:attrName>style.visibility</p:attrName>
+                                        </p:attrNameLst>
+                                      </p:cBhvr>
+                                      <p:to>
+                                        <p:strVal val="visible"/>
+                                      </p:to>
+                                    </p:set>
+                                  </p:childTnLst>
+                                </p:cTn>
+                              </p:par>
+                              <p:par>
+                                <p:cTn id="13" presetID="1" presetClass="entr" presetSubtype="0" fill="hold" nodeType="withEffect">
+                                  <p:stCondLst>
+                                    <p:cond delay="0"/>
+                                  </p:stCondLst>
+                                  <p:childTnLst>
+                                    <p:set>
+                                      <p:cBhvr>
+                                        <p:cTn id="14" dur="1" fill="hold">
+                                          <p:stCondLst>
+                                            <p:cond delay="0"/>
+                                          </p:stCondLst>
+                                        </p:cTn>
+                                        <p:tgtEl>
+                                          <p:spTgt spid="17"/>
+                                        </p:tgtEl>
+                                        <p:attrNameLst>
+                                          <p:attrName>style.visibility</p:attrName>
+                                        </p:attrNameLst>
+                                      </p:cBhvr>
+                                      <p:to>
+                                        <p:strVal val="visible"/>
+                                      </p:to>
+                                    </p:set>
+                                  </p:childTnLst>
+                                </p:cTn>
+                              </p:par>
+                              <p:par>
+                                <p:cTn id="15" presetID="1" presetClass="entr" presetSubtype="0" fill="hold" grpId="0" nodeType="withEffect">
+                                  <p:stCondLst>
+                                    <p:cond delay="0"/>
+                                  </p:stCondLst>
+                                  <p:childTnLst>
+                                    <p:set>
+                                      <p:cBhvr>
+                                        <p:cTn id="16" dur="1" fill="hold">
+                                          <p:stCondLst>
+                                            <p:cond delay="0"/>
+                                          </p:stCondLst>
+                                        </p:cTn>
+                                        <p:tgtEl>
+                                          <p:spTgt spid="14"/>
+                                        </p:tgtEl>
+                                        <p:attrNameLst>
+                                          <p:attrName>style.visibility</p:attrName>
+                                        </p:attrNameLst>
+                                      </p:cBhvr>
+                                      <p:to>
+                                        <p:strVal val="visible"/>
+                                      </p:to>
+                                    </p:set>
+                                  </p:childTnLst>
+                                </p:cTn>
+                              </p:par>
+                              <p:par>
+                                <p:cTn id="17" presetID="1" presetClass="entr" presetSubtype="0" fill="hold" grpId="0" nodeType="withEffect">
+                                  <p:stCondLst>
+                                    <p:cond delay="0"/>
+                                  </p:stCondLst>
+                                  <p:childTnLst>
+                                    <p:set>
+                                      <p:cBhvr>
+                                        <p:cTn id="18" dur="1" fill="hold">
+                                          <p:stCondLst>
+                                            <p:cond delay="0"/>
+                                          </p:stCondLst>
+                                        </p:cTn>
+                                        <p:tgtEl>
+                                          <p:spTgt spid="13"/>
+                                        </p:tgtEl>
+                                        <p:attrNameLst>
+                                          <p:attrName>style.visibility</p:attrName>
+                                        </p:attrNameLst>
+                                      </p:cBhvr>
+                                      <p:to>
+                                        <p:strVal val="visible"/>
+                                      </p:to>
+                                    </p:set>
+                                  </p:childTnLst>
+                                </p:cTn>
+                              </p:par>
+                              <p:par>
+                                <p:cTn id="19" presetID="1" presetClass="entr" presetSubtype="0" fill="hold" nodeType="withEffect">
+                                  <p:stCondLst>
+                                    <p:cond delay="0"/>
+                                  </p:stCondLst>
+                                  <p:childTnLst>
+                                    <p:set>
+                                      <p:cBhvr>
+                                        <p:cTn id="20" dur="1" fill="hold">
+                                          <p:stCondLst>
+                                            <p:cond delay="0"/>
+                                          </p:stCondLst>
+                                        </p:cTn>
+                                        <p:tgtEl>
+                                          <p:spTgt spid="18"/>
+                                        </p:tgtEl>
+                                        <p:attrNameLst>
+                                          <p:attrName>style.visibility</p:attrName>
+                                        </p:attrNameLst>
+                                      </p:cBhvr>
+                                      <p:to>
+                                        <p:strVal val="visible"/>
+                                      </p:to>
+                                    </p:set>
+                                  </p:childTnLst>
+                                </p:cTn>
+                              </p:par>
+                              <p:par>
+                                <p:cTn id="21" presetID="1" presetClass="entr" presetSubtype="0" fill="hold" grpId="0" nodeType="withEffect">
+                                  <p:stCondLst>
+                                    <p:cond delay="0"/>
+                                  </p:stCondLst>
+                                  <p:childTnLst>
+                                    <p:set>
+                                      <p:cBhvr>
+                                        <p:cTn id="22" dur="1" fill="hold">
+                                          <p:stCondLst>
+                                            <p:cond delay="0"/>
+                                          </p:stCondLst>
+                                        </p:cTn>
+                                        <p:tgtEl>
+                                          <p:spTgt spid="15"/>
+                                        </p:tgtEl>
+                                        <p:attrNameLst>
+                                          <p:attrName>style.visibility</p:attrName>
+                                        </p:attrNameLst>
+                                      </p:cBhvr>
+                                      <p:to>
+                                        <p:strVal val="visible"/>
+                                      </p:to>
+                                    </p:set>
+                                  </p:childTnLst>
+                                </p:cTn>
+                              </p:par>
+                            </p:childTnLst>
+                          </p:cTn>
+                        </p:par>
+                      </p:childTnLst>
+                    </p:cTn>
+                  </p:par>
+                </p:childTnLst>
+              </p:cTn>
+              <p:prevCondLst>
+                <p:cond evt="onPrev" delay="0">
+                  <p:tgtEl>
+                    <p:sldTgt/>
+                  </p:tgtEl>
+                </p:cond>
+              </p:prevCondLst>
+              <p:nextCondLst>
+                <p:cond evt="onNext" delay="0">
+                  <p:tgtEl>
+                    <p:sldTgt/>
+                  </p:tgtEl>
+                </p:cond>
+              </p:nextCondLst>
+            </p:seq>
+          </p:childTnLst>
+        </p:cTn>
+      </p:par>
+    </p:tnLst>
+    <p:bldLst>
+      <p:bldP spid="11" grpId="0" animBg="1"/>
+      <p:bldP spid="12" grpId="0" animBg="1"/>
+      <p:bldP spid="13" grpId="0" animBg="1"/>
+      <p:bldP spid="14" grpId="0"/>
+      <p:bldP spid="15" grpId="0"/>
+    </p:bldLst>
+  </p:timing>
 </p:sld>
 </file>
 
@@ -6702,6 +7298,83 @@
           </a:fontRef>
         </p:style>
       </p:cxnSp>
+      <p:sp>
+        <p:nvSpPr>
+          <p:cNvPr id="12" name="TextBox 11">
+            <a:extLst>
+              <a:ext uri="{FF2B5EF4-FFF2-40B4-BE49-F238E27FC236}">
+                <a16:creationId xmlns:a16="http://schemas.microsoft.com/office/drawing/2014/main" id="{E92F7157-7836-4360-9E56-BF5F67740CAA}"/>
+              </a:ext>
+            </a:extLst>
+          </p:cNvPr>
+          <p:cNvSpPr txBox="1"/>
+          <p:nvPr/>
+        </p:nvSpPr>
+        <p:spPr>
+          <a:xfrm>
+            <a:off x="6750729" y="5704539"/>
+            <a:ext cx="1966753" cy="369332"/>
+          </a:xfrm>
+          <a:prstGeom prst="rect">
+            <a:avLst/>
+          </a:prstGeom>
+          <a:noFill/>
+        </p:spPr>
+        <p:txBody>
+          <a:bodyPr wrap="square" rtlCol="0">
+            <a:spAutoFit/>
+          </a:bodyPr>
+          <a:lstStyle/>
+          <a:p>
+            <a:r>
+              <a:rPr lang="en-US" dirty="0"/>
+              <a:t>URI of file on disk</a:t>
+            </a:r>
+            <a:endParaRPr lang="en-GB" dirty="0"/>
+          </a:p>
+        </p:txBody>
+      </p:sp>
+      <p:cxnSp>
+        <p:nvCxnSpPr>
+          <p:cNvPr id="14" name="Straight Arrow Connector 13">
+            <a:extLst>
+              <a:ext uri="{FF2B5EF4-FFF2-40B4-BE49-F238E27FC236}">
+                <a16:creationId xmlns:a16="http://schemas.microsoft.com/office/drawing/2014/main" id="{A2675138-25FC-4C71-959C-C250C11719C1}"/>
+              </a:ext>
+            </a:extLst>
+          </p:cNvPr>
+          <p:cNvCxnSpPr>
+            <a:cxnSpLocks/>
+          </p:cNvCxnSpPr>
+          <p:nvPr/>
+        </p:nvCxnSpPr>
+        <p:spPr>
+          <a:xfrm flipV="1">
+            <a:off x="7584594" y="4884234"/>
+            <a:ext cx="69603" cy="777940"/>
+          </a:xfrm>
+          <a:prstGeom prst="straightConnector1">
+            <a:avLst/>
+          </a:prstGeom>
+          <a:ln w="25400">
+            <a:tailEnd type="triangle"/>
+          </a:ln>
+        </p:spPr>
+        <p:style>
+          <a:lnRef idx="1">
+            <a:schemeClr val="accent1"/>
+          </a:lnRef>
+          <a:fillRef idx="0">
+            <a:schemeClr val="accent1"/>
+          </a:fillRef>
+          <a:effectRef idx="0">
+            <a:schemeClr val="accent1"/>
+          </a:effectRef>
+          <a:fontRef idx="minor">
+            <a:schemeClr val="tx1"/>
+          </a:fontRef>
+        </p:style>
+      </p:cxnSp>
     </p:spTree>
     <p:extLst>
       <p:ext uri="{BB962C8B-B14F-4D97-AF65-F5344CB8AC3E}">
@@ -6712,6 +7385,166 @@
   <p:clrMapOvr>
     <a:masterClrMapping/>
   </p:clrMapOvr>
+  <p:timing>
+    <p:tnLst>
+      <p:par>
+        <p:cTn id="1" dur="indefinite" restart="never" nodeType="tmRoot">
+          <p:childTnLst>
+            <p:seq concurrent="1" nextAc="seek">
+              <p:cTn id="2" dur="indefinite" nodeType="mainSeq">
+                <p:childTnLst>
+                  <p:par>
+                    <p:cTn id="3" fill="hold">
+                      <p:stCondLst>
+                        <p:cond delay="indefinite"/>
+                      </p:stCondLst>
+                      <p:childTnLst>
+                        <p:par>
+                          <p:cTn id="4" fill="hold">
+                            <p:stCondLst>
+                              <p:cond delay="0"/>
+                            </p:stCondLst>
+                            <p:childTnLst>
+                              <p:par>
+                                <p:cTn id="5" presetID="1" presetClass="entr" presetSubtype="0" fill="hold" nodeType="clickEffect">
+                                  <p:stCondLst>
+                                    <p:cond delay="0"/>
+                                  </p:stCondLst>
+                                  <p:childTnLst>
+                                    <p:set>
+                                      <p:cBhvr>
+                                        <p:cTn id="6" dur="1" fill="hold">
+                                          <p:stCondLst>
+                                            <p:cond delay="0"/>
+                                          </p:stCondLst>
+                                        </p:cTn>
+                                        <p:tgtEl>
+                                          <p:spTgt spid="20"/>
+                                        </p:tgtEl>
+                                        <p:attrNameLst>
+                                          <p:attrName>style.visibility</p:attrName>
+                                        </p:attrNameLst>
+                                      </p:cBhvr>
+                                      <p:to>
+                                        <p:strVal val="visible"/>
+                                      </p:to>
+                                    </p:set>
+                                  </p:childTnLst>
+                                </p:cTn>
+                              </p:par>
+                              <p:par>
+                                <p:cTn id="7" presetID="1" presetClass="entr" presetSubtype="0" fill="hold" grpId="0" nodeType="withEffect">
+                                  <p:stCondLst>
+                                    <p:cond delay="0"/>
+                                  </p:stCondLst>
+                                  <p:childTnLst>
+                                    <p:set>
+                                      <p:cBhvr>
+                                        <p:cTn id="8" dur="1" fill="hold">
+                                          <p:stCondLst>
+                                            <p:cond delay="0"/>
+                                          </p:stCondLst>
+                                        </p:cTn>
+                                        <p:tgtEl>
+                                          <p:spTgt spid="13"/>
+                                        </p:tgtEl>
+                                        <p:attrNameLst>
+                                          <p:attrName>style.visibility</p:attrName>
+                                        </p:attrNameLst>
+                                      </p:cBhvr>
+                                      <p:to>
+                                        <p:strVal val="visible"/>
+                                      </p:to>
+                                    </p:set>
+                                  </p:childTnLst>
+                                </p:cTn>
+                              </p:par>
+                              <p:par>
+                                <p:cTn id="9" presetID="1" presetClass="entr" presetSubtype="0" fill="hold" nodeType="withEffect">
+                                  <p:stCondLst>
+                                    <p:cond delay="0"/>
+                                  </p:stCondLst>
+                                  <p:childTnLst>
+                                    <p:set>
+                                      <p:cBhvr>
+                                        <p:cTn id="10" dur="1" fill="hold">
+                                          <p:stCondLst>
+                                            <p:cond delay="0"/>
+                                          </p:stCondLst>
+                                        </p:cTn>
+                                        <p:tgtEl>
+                                          <p:spTgt spid="14"/>
+                                        </p:tgtEl>
+                                        <p:attrNameLst>
+                                          <p:attrName>style.visibility</p:attrName>
+                                        </p:attrNameLst>
+                                      </p:cBhvr>
+                                      <p:to>
+                                        <p:strVal val="visible"/>
+                                      </p:to>
+                                    </p:set>
+                                  </p:childTnLst>
+                                </p:cTn>
+                              </p:par>
+                              <p:par>
+                                <p:cTn id="11" presetID="1" presetClass="entr" presetSubtype="0" fill="hold" grpId="0" nodeType="withEffect">
+                                  <p:stCondLst>
+                                    <p:cond delay="0"/>
+                                  </p:stCondLst>
+                                  <p:childTnLst>
+                                    <p:set>
+                                      <p:cBhvr>
+                                        <p:cTn id="12" dur="1" fill="hold">
+                                          <p:stCondLst>
+                                            <p:cond delay="0"/>
+                                          </p:stCondLst>
+                                        </p:cTn>
+                                        <p:tgtEl>
+                                          <p:spTgt spid="12"/>
+                                        </p:tgtEl>
+                                        <p:attrNameLst>
+                                          <p:attrName>style.visibility</p:attrName>
+                                        </p:attrNameLst>
+                                      </p:cBhvr>
+                                      <p:to>
+                                        <p:strVal val="visible"/>
+                                      </p:to>
+                                    </p:set>
+                                  </p:childTnLst>
+                                </p:cTn>
+                              </p:par>
+                            </p:childTnLst>
+                          </p:cTn>
+                        </p:par>
+                      </p:childTnLst>
+                    </p:cTn>
+                  </p:par>
+                </p:childTnLst>
+              </p:cTn>
+              <p:prevCondLst>
+                <p:cond evt="onPrev" delay="0">
+                  <p:tgtEl>
+                    <p:sldTgt/>
+                  </p:tgtEl>
+                </p:cond>
+              </p:prevCondLst>
+              <p:nextCondLst>
+                <p:cond evt="onNext" delay="0">
+                  <p:tgtEl>
+                    <p:sldTgt/>
+                  </p:tgtEl>
+                </p:cond>
+              </p:nextCondLst>
+            </p:seq>
+          </p:childTnLst>
+        </p:cTn>
+      </p:par>
+    </p:tnLst>
+    <p:bldLst>
+      <p:bldP spid="13" grpId="0" animBg="1"/>
+      <p:bldP spid="12" grpId="0"/>
+    </p:bldLst>
+  </p:timing>
 </p:sld>
 </file>
 
@@ -6926,8 +7759,8 @@
         </p:nvSpPr>
         <p:spPr>
           <a:xfrm>
-            <a:off x="6877500" y="4205255"/>
-            <a:ext cx="2530851" cy="830997"/>
+            <a:off x="495115" y="4900792"/>
+            <a:ext cx="11579426" cy="461665"/>
           </a:xfrm>
           <a:prstGeom prst="rect">
             <a:avLst/>
@@ -6941,36 +7774,46 @@
           <a:lstStyle/>
           <a:p>
             <a:r>
-              <a:rPr lang="en-US" sz="1600" dirty="0"/>
-              <a:t>All documents in the archive with base-</a:t>
-            </a:r>
-            <a:r>
-              <a:rPr lang="en-US" sz="1600" dirty="0" err="1"/>
+              <a:rPr lang="en-US" sz="2400" dirty="0"/>
+              <a:t>All 2 documents in the archive with property </a:t>
+            </a:r>
+            <a:r>
+              <a:rPr lang="en-US" sz="2400" b="1" dirty="0">
+                <a:latin typeface="Courier New" panose="02070309020205020404" pitchFamily="49" charset="0"/>
+                <a:cs typeface="Courier New" panose="02070309020205020404" pitchFamily="49" charset="0"/>
+              </a:rPr>
+              <a:t>base-</a:t>
+            </a:r>
+            <a:r>
+              <a:rPr lang="en-US" sz="2400" b="1" dirty="0" err="1">
+                <a:latin typeface="Courier New" panose="02070309020205020404" pitchFamily="49" charset="0"/>
+                <a:cs typeface="Courier New" panose="02070309020205020404" pitchFamily="49" charset="0"/>
+              </a:rPr>
               <a:t>uri</a:t>
             </a:r>
             <a:r>
-              <a:rPr lang="en-US" sz="1600" dirty="0"/>
+              <a:rPr lang="en-US" sz="2400" dirty="0"/>
               <a:t> same as </a:t>
             </a:r>
             <a:r>
-              <a:rPr lang="en-US" sz="1600" b="1" dirty="0">
+              <a:rPr lang="en-US" sz="2400" b="1" dirty="0">
                 <a:latin typeface="Courier New" panose="02070309020205020404" pitchFamily="49" charset="0"/>
                 <a:cs typeface="Courier New" panose="02070309020205020404" pitchFamily="49" charset="0"/>
               </a:rPr>
               <a:t>@</a:t>
             </a:r>
             <a:r>
-              <a:rPr lang="en-US" sz="1600" b="1" dirty="0" err="1">
+              <a:rPr lang="en-US" sz="2400" b="1" dirty="0" err="1">
                 <a:latin typeface="Courier New" panose="02070309020205020404" pitchFamily="49" charset="0"/>
                 <a:cs typeface="Courier New" panose="02070309020205020404" pitchFamily="49" charset="0"/>
               </a:rPr>
               <a:t>href</a:t>
             </a:r>
             <a:r>
-              <a:rPr lang="en-US" sz="1600" dirty="0"/>
-              <a:t> in the manifest</a:t>
-            </a:r>
-            <a:endParaRPr lang="en-GB" sz="1600" dirty="0"/>
+              <a:rPr lang="en-US" sz="2400" dirty="0"/>
+              <a:t> in the manifest!</a:t>
+            </a:r>
+            <a:endParaRPr lang="en-GB" sz="2400" dirty="0"/>
           </a:p>
         </p:txBody>
       </p:sp>
@@ -6988,8 +7831,8 @@
         </p:nvSpPr>
         <p:spPr>
           <a:xfrm>
-            <a:off x="174069" y="1299636"/>
-            <a:ext cx="6525753" cy="3108543"/>
+            <a:off x="1574662" y="1554993"/>
+            <a:ext cx="5388159" cy="307777"/>
           </a:xfrm>
           <a:prstGeom prst="rect">
             <a:avLst/>
@@ -7011,250 +7854,21 @@
                 <a:latin typeface="Courier New" panose="02070309020205020404" pitchFamily="49" charset="0"/>
                 <a:cs typeface="Courier New" panose="02070309020205020404" pitchFamily="49" charset="0"/>
               </a:rPr>
-              <a:t>&lt;</a:t>
+              <a:t>base-</a:t>
             </a:r>
             <a:r>
               <a:rPr lang="en-GB" sz="1400" b="1" dirty="0" err="1">
                 <a:latin typeface="Courier New" panose="02070309020205020404" pitchFamily="49" charset="0"/>
                 <a:cs typeface="Courier New" panose="02070309020205020404" pitchFamily="49" charset="0"/>
               </a:rPr>
-              <a:t>c:archive</a:t>
+              <a:t>uri</a:t>
             </a:r>
             <a:r>
               <a:rPr lang="en-GB" sz="1400" b="1" dirty="0">
                 <a:latin typeface="Courier New" panose="02070309020205020404" pitchFamily="49" charset="0"/>
                 <a:cs typeface="Courier New" panose="02070309020205020404" pitchFamily="49" charset="0"/>
               </a:rPr>
-              <a:t> </a:t>
-            </a:r>
-            <a:r>
-              <a:rPr lang="en-GB" sz="1400" b="1" dirty="0" err="1">
-                <a:latin typeface="Courier New" panose="02070309020205020404" pitchFamily="49" charset="0"/>
-                <a:cs typeface="Courier New" panose="02070309020205020404" pitchFamily="49" charset="0"/>
-              </a:rPr>
-              <a:t>xmlns:c</a:t>
-            </a:r>
-            <a:r>
-              <a:rPr lang="en-GB" sz="1400" b="1" dirty="0">
-                <a:latin typeface="Courier New" panose="02070309020205020404" pitchFamily="49" charset="0"/>
-                <a:cs typeface="Courier New" panose="02070309020205020404" pitchFamily="49" charset="0"/>
-              </a:rPr>
-              <a:t>="http://www.w3.org/ns/xproc-step"&gt;</a:t>
-            </a:r>
-          </a:p>
-          <a:p>
-            <a:r>
-              <a:rPr lang="en-GB" sz="1400" b="1" dirty="0">
-                <a:latin typeface="Courier New" panose="02070309020205020404" pitchFamily="49" charset="0"/>
-                <a:cs typeface="Courier New" panose="02070309020205020404" pitchFamily="49" charset="0"/>
-              </a:rPr>
-              <a:t>   &lt;</a:t>
-            </a:r>
-            <a:r>
-              <a:rPr lang="en-GB" sz="1400" b="1" dirty="0" err="1">
-                <a:latin typeface="Courier New" panose="02070309020205020404" pitchFamily="49" charset="0"/>
-                <a:cs typeface="Courier New" panose="02070309020205020404" pitchFamily="49" charset="0"/>
-              </a:rPr>
-              <a:t>c:entry</a:t>
-            </a:r>
-            <a:r>
-              <a:rPr lang="en-GB" sz="1400" b="1" dirty="0">
-                <a:latin typeface="Courier New" panose="02070309020205020404" pitchFamily="49" charset="0"/>
-                <a:cs typeface="Courier New" panose="02070309020205020404" pitchFamily="49" charset="0"/>
-              </a:rPr>
-              <a:t> name="demo.html"</a:t>
-            </a:r>
-          </a:p>
-          <a:p>
-            <a:r>
-              <a:rPr lang="en-GB" sz="1400" b="1" dirty="0">
-                <a:latin typeface="Courier New" panose="02070309020205020404" pitchFamily="49" charset="0"/>
-                <a:cs typeface="Courier New" panose="02070309020205020404" pitchFamily="49" charset="0"/>
-              </a:rPr>
-              <a:t>            </a:t>
-            </a:r>
-            <a:r>
-              <a:rPr lang="en-GB" sz="1400" b="1" dirty="0" err="1">
-                <a:latin typeface="Courier New" panose="02070309020205020404" pitchFamily="49" charset="0"/>
-                <a:cs typeface="Courier New" panose="02070309020205020404" pitchFamily="49" charset="0"/>
-              </a:rPr>
-              <a:t>href</a:t>
-            </a:r>
-            <a:r>
-              <a:rPr lang="en-GB" sz="1400" b="1" dirty="0">
-                <a:latin typeface="Courier New" panose="02070309020205020404" pitchFamily="49" charset="0"/>
-                <a:cs typeface="Courier New" panose="02070309020205020404" pitchFamily="49" charset="0"/>
-              </a:rPr>
-              <a:t>="file:///.../input/input.zip/demo.html"</a:t>
-            </a:r>
-          </a:p>
-          <a:p>
-            <a:r>
-              <a:rPr lang="en-GB" sz="1400" b="1" dirty="0">
-                <a:latin typeface="Courier New" panose="02070309020205020404" pitchFamily="49" charset="0"/>
-                <a:cs typeface="Courier New" panose="02070309020205020404" pitchFamily="49" charset="0"/>
-              </a:rPr>
-              <a:t>            method="deflated"</a:t>
-            </a:r>
-          </a:p>
-          <a:p>
-            <a:r>
-              <a:rPr lang="en-GB" sz="1400" b="1" dirty="0">
-                <a:latin typeface="Courier New" panose="02070309020205020404" pitchFamily="49" charset="0"/>
-                <a:cs typeface="Courier New" panose="02070309020205020404" pitchFamily="49" charset="0"/>
-              </a:rPr>
-              <a:t>            size="219"</a:t>
-            </a:r>
-          </a:p>
-          <a:p>
-            <a:r>
-              <a:rPr lang="en-GB" sz="1400" b="1" dirty="0">
-                <a:latin typeface="Courier New" panose="02070309020205020404" pitchFamily="49" charset="0"/>
-                <a:cs typeface="Courier New" panose="02070309020205020404" pitchFamily="49" charset="0"/>
-              </a:rPr>
-              <a:t>            compressed-size="150"</a:t>
-            </a:r>
-          </a:p>
-          <a:p>
-            <a:r>
-              <a:rPr lang="en-GB" sz="1400" b="1" dirty="0">
-                <a:latin typeface="Courier New" panose="02070309020205020404" pitchFamily="49" charset="0"/>
-                <a:cs typeface="Courier New" panose="02070309020205020404" pitchFamily="49" charset="0"/>
-              </a:rPr>
-              <a:t>            time="2020-02-06T08:19:06+01:00"/&gt;</a:t>
-            </a:r>
-          </a:p>
-          <a:p>
-            <a:r>
-              <a:rPr lang="en-GB" sz="1400" b="1" dirty="0">
-                <a:latin typeface="Courier New" panose="02070309020205020404" pitchFamily="49" charset="0"/>
-                <a:cs typeface="Courier New" panose="02070309020205020404" pitchFamily="49" charset="0"/>
-              </a:rPr>
-              <a:t>   &lt;</a:t>
-            </a:r>
-            <a:r>
-              <a:rPr lang="en-GB" sz="1400" b="1" dirty="0" err="1">
-                <a:latin typeface="Courier New" panose="02070309020205020404" pitchFamily="49" charset="0"/>
-                <a:cs typeface="Courier New" panose="02070309020205020404" pitchFamily="49" charset="0"/>
-              </a:rPr>
-              <a:t>c:entry</a:t>
-            </a:r>
-            <a:r>
-              <a:rPr lang="en-GB" sz="1400" b="1" dirty="0">
-                <a:latin typeface="Courier New" panose="02070309020205020404" pitchFamily="49" charset="0"/>
-                <a:cs typeface="Courier New" panose="02070309020205020404" pitchFamily="49" charset="0"/>
-              </a:rPr>
-              <a:t> name="</a:t>
-            </a:r>
-            <a:r>
-              <a:rPr lang="en-GB" sz="1400" b="1" dirty="0" err="1">
-                <a:latin typeface="Courier New" panose="02070309020205020404" pitchFamily="49" charset="0"/>
-                <a:cs typeface="Courier New" panose="02070309020205020404" pitchFamily="49" charset="0"/>
-              </a:rPr>
-              <a:t>img</a:t>
-            </a:r>
-            <a:r>
-              <a:rPr lang="en-GB" sz="1400" b="1" dirty="0">
-                <a:latin typeface="Courier New" panose="02070309020205020404" pitchFamily="49" charset="0"/>
-                <a:cs typeface="Courier New" panose="02070309020205020404" pitchFamily="49" charset="0"/>
-              </a:rPr>
-              <a:t>/old.png"</a:t>
-            </a:r>
-          </a:p>
-          <a:p>
-            <a:r>
-              <a:rPr lang="en-GB" sz="1400" b="1" dirty="0">
-                <a:latin typeface="Courier New" panose="02070309020205020404" pitchFamily="49" charset="0"/>
-                <a:cs typeface="Courier New" panose="02070309020205020404" pitchFamily="49" charset="0"/>
-              </a:rPr>
-              <a:t>            </a:t>
-            </a:r>
-            <a:r>
-              <a:rPr lang="en-GB" sz="1400" b="1" dirty="0" err="1">
-                <a:latin typeface="Courier New" panose="02070309020205020404" pitchFamily="49" charset="0"/>
-                <a:cs typeface="Courier New" panose="02070309020205020404" pitchFamily="49" charset="0"/>
-              </a:rPr>
-              <a:t>href</a:t>
-            </a:r>
-            <a:r>
-              <a:rPr lang="en-GB" sz="1400" b="1" dirty="0">
-                <a:latin typeface="Courier New" panose="02070309020205020404" pitchFamily="49" charset="0"/>
-                <a:cs typeface="Courier New" panose="02070309020205020404" pitchFamily="49" charset="0"/>
-              </a:rPr>
-              <a:t>="file:///.../input/input.zip/</a:t>
-            </a:r>
-            <a:r>
-              <a:rPr lang="en-GB" sz="1400" b="1" dirty="0" err="1">
-                <a:latin typeface="Courier New" panose="02070309020205020404" pitchFamily="49" charset="0"/>
-                <a:cs typeface="Courier New" panose="02070309020205020404" pitchFamily="49" charset="0"/>
-              </a:rPr>
-              <a:t>img</a:t>
-            </a:r>
-            <a:r>
-              <a:rPr lang="en-GB" sz="1400" b="1" dirty="0">
-                <a:latin typeface="Courier New" panose="02070309020205020404" pitchFamily="49" charset="0"/>
-                <a:cs typeface="Courier New" panose="02070309020205020404" pitchFamily="49" charset="0"/>
-              </a:rPr>
-              <a:t>/old.png"</a:t>
-            </a:r>
-          </a:p>
-          <a:p>
-            <a:r>
-              <a:rPr lang="en-GB" sz="1400" b="1" dirty="0">
-                <a:latin typeface="Courier New" panose="02070309020205020404" pitchFamily="49" charset="0"/>
-                <a:cs typeface="Courier New" panose="02070309020205020404" pitchFamily="49" charset="0"/>
-              </a:rPr>
-              <a:t>            method="deflated"</a:t>
-            </a:r>
-          </a:p>
-          <a:p>
-            <a:r>
-              <a:rPr lang="en-GB" sz="1400" b="1" dirty="0">
-                <a:latin typeface="Courier New" panose="02070309020205020404" pitchFamily="49" charset="0"/>
-                <a:cs typeface="Courier New" panose="02070309020205020404" pitchFamily="49" charset="0"/>
-              </a:rPr>
-              <a:t>            size="7522"</a:t>
-            </a:r>
-          </a:p>
-          <a:p>
-            <a:r>
-              <a:rPr lang="en-GB" sz="1400" b="1" dirty="0">
-                <a:latin typeface="Courier New" panose="02070309020205020404" pitchFamily="49" charset="0"/>
-                <a:cs typeface="Courier New" panose="02070309020205020404" pitchFamily="49" charset="0"/>
-              </a:rPr>
-              <a:t>            compressed-size="7043"</a:t>
-            </a:r>
-          </a:p>
-          <a:p>
-            <a:r>
-              <a:rPr lang="en-GB" sz="1400" b="1" dirty="0">
-                <a:latin typeface="Courier New" panose="02070309020205020404" pitchFamily="49" charset="0"/>
-                <a:cs typeface="Courier New" panose="02070309020205020404" pitchFamily="49" charset="0"/>
-              </a:rPr>
-              <a:t>            time="2019-03-14T15:22:48+01:00"/&gt;</a:t>
-            </a:r>
-          </a:p>
-          <a:p>
-            <a:r>
-              <a:rPr lang="en-GB" sz="1400" b="1" dirty="0">
-                <a:latin typeface="Courier New" panose="02070309020205020404" pitchFamily="49" charset="0"/>
-                <a:cs typeface="Courier New" panose="02070309020205020404" pitchFamily="49" charset="0"/>
-              </a:rPr>
-              <a:t>&lt;/</a:t>
-            </a:r>
-            <a:r>
-              <a:rPr lang="en-GB" sz="1400" b="1" dirty="0" err="1">
-                <a:latin typeface="Courier New" panose="02070309020205020404" pitchFamily="49" charset="0"/>
-                <a:cs typeface="Courier New" panose="02070309020205020404" pitchFamily="49" charset="0"/>
-              </a:rPr>
-              <a:t>c:archive</a:t>
-            </a:r>
-            <a:r>
-              <a:rPr lang="en-GB" sz="1400" b="1" dirty="0">
-                <a:latin typeface="Courier New" panose="02070309020205020404" pitchFamily="49" charset="0"/>
-                <a:cs typeface="Courier New" panose="02070309020205020404" pitchFamily="49" charset="0"/>
-              </a:rPr>
-              <a:t>&gt;</a:t>
+              <a:t> = file:///.../input/input.zip/demo.html</a:t>
             </a:r>
           </a:p>
         </p:txBody>
@@ -7387,6 +8001,76 @@
           </a:fontRef>
         </p:style>
       </p:cxnSp>
+      <p:sp>
+        <p:nvSpPr>
+          <p:cNvPr id="14" name="TextBox 13">
+            <a:extLst>
+              <a:ext uri="{FF2B5EF4-FFF2-40B4-BE49-F238E27FC236}">
+                <a16:creationId xmlns:a16="http://schemas.microsoft.com/office/drawing/2014/main" id="{A9ECBD08-046B-4997-BD96-1EA305500074}"/>
+              </a:ext>
+            </a:extLst>
+          </p:cNvPr>
+          <p:cNvSpPr txBox="1"/>
+          <p:nvPr/>
+        </p:nvSpPr>
+        <p:spPr>
+          <a:xfrm>
+            <a:off x="853590" y="3096348"/>
+            <a:ext cx="5531655" cy="307777"/>
+          </a:xfrm>
+          <a:prstGeom prst="rect">
+            <a:avLst/>
+          </a:prstGeom>
+          <a:solidFill>
+            <a:schemeClr val="bg1">
+              <a:lumMod val="95000"/>
+            </a:schemeClr>
+          </a:solidFill>
+        </p:spPr>
+        <p:txBody>
+          <a:bodyPr wrap="square" rtlCol="0">
+            <a:spAutoFit/>
+          </a:bodyPr>
+          <a:lstStyle/>
+          <a:p>
+            <a:r>
+              <a:rPr lang="en-GB" sz="1400" b="1" dirty="0">
+                <a:latin typeface="Courier New" panose="02070309020205020404" pitchFamily="49" charset="0"/>
+                <a:cs typeface="Courier New" panose="02070309020205020404" pitchFamily="49" charset="0"/>
+              </a:rPr>
+              <a:t>base-</a:t>
+            </a:r>
+            <a:r>
+              <a:rPr lang="en-GB" sz="1400" b="1" dirty="0" err="1">
+                <a:latin typeface="Courier New" panose="02070309020205020404" pitchFamily="49" charset="0"/>
+                <a:cs typeface="Courier New" panose="02070309020205020404" pitchFamily="49" charset="0"/>
+              </a:rPr>
+              <a:t>uri</a:t>
+            </a:r>
+            <a:r>
+              <a:rPr lang="en-GB" sz="1400" b="1" dirty="0">
+                <a:latin typeface="Courier New" panose="02070309020205020404" pitchFamily="49" charset="0"/>
+                <a:cs typeface="Courier New" panose="02070309020205020404" pitchFamily="49" charset="0"/>
+              </a:rPr>
+              <a:t> = file:///.../input/input.zip/</a:t>
+            </a:r>
+            <a:r>
+              <a:rPr lang="en-GB" sz="1400" b="1" dirty="0" err="1">
+                <a:latin typeface="Courier New" panose="02070309020205020404" pitchFamily="49" charset="0"/>
+                <a:cs typeface="Courier New" panose="02070309020205020404" pitchFamily="49" charset="0"/>
+              </a:rPr>
+              <a:t>img</a:t>
+            </a:r>
+            <a:r>
+              <a:rPr lang="en-GB" sz="1400" b="1" dirty="0">
+                <a:latin typeface="Courier New" panose="02070309020205020404" pitchFamily="49" charset="0"/>
+                <a:cs typeface="Courier New" panose="02070309020205020404" pitchFamily="49" charset="0"/>
+              </a:rPr>
+              <a:t>/old.png</a:t>
+            </a:r>
+          </a:p>
+        </p:txBody>
+      </p:sp>
     </p:spTree>
     <p:extLst>
       <p:ext uri="{BB962C8B-B14F-4D97-AF65-F5344CB8AC3E}">
@@ -7439,7 +8123,7 @@
         </p:blipFill>
         <p:spPr>
           <a:xfrm>
-            <a:off x="6887430" y="373336"/>
+            <a:off x="7962407" y="471466"/>
             <a:ext cx="1184898" cy="1166668"/>
           </a:xfrm>
           <a:prstGeom prst="rect">
@@ -7466,7 +8150,7 @@
         </p:nvSpPr>
         <p:spPr>
           <a:xfrm>
-            <a:off x="6414523" y="2271193"/>
+            <a:off x="7489500" y="2369323"/>
             <a:ext cx="2149490" cy="338025"/>
           </a:xfrm>
           <a:prstGeom prst="roundRect">
@@ -7516,7 +8200,7 @@
         </p:nvSpPr>
         <p:spPr>
           <a:xfrm>
-            <a:off x="7293532" y="2735617"/>
+            <a:off x="8368509" y="2833747"/>
             <a:ext cx="372694" cy="1268675"/>
           </a:xfrm>
           <a:prstGeom prst="downArrow">
@@ -7562,7 +8246,7 @@
         </p:nvSpPr>
         <p:spPr>
           <a:xfrm>
-            <a:off x="6045438" y="2839624"/>
+            <a:off x="7120415" y="2937754"/>
             <a:ext cx="1174419" cy="736721"/>
           </a:xfrm>
           <a:prstGeom prst="flowChartMultidocument">
@@ -7611,7 +8295,7 @@
         </p:nvSpPr>
         <p:spPr>
           <a:xfrm>
-            <a:off x="7365758" y="1624660"/>
+            <a:off x="8440735" y="1722790"/>
             <a:ext cx="247019" cy="581167"/>
           </a:xfrm>
           <a:prstGeom prst="downArrow">
@@ -7657,7 +8341,7 @@
         </p:nvSpPr>
         <p:spPr>
           <a:xfrm>
-            <a:off x="6414523" y="4130691"/>
+            <a:off x="7489500" y="4228821"/>
             <a:ext cx="2149490" cy="338025"/>
           </a:xfrm>
           <a:prstGeom prst="roundRect">
@@ -7707,7 +8391,7 @@
         </p:nvSpPr>
         <p:spPr>
           <a:xfrm>
-            <a:off x="7293532" y="4642784"/>
+            <a:off x="8368509" y="4740914"/>
             <a:ext cx="372694" cy="696271"/>
           </a:xfrm>
           <a:prstGeom prst="downArrow">
@@ -7753,7 +8437,7 @@
         </p:nvSpPr>
         <p:spPr>
           <a:xfrm>
-            <a:off x="5932767" y="4595115"/>
+            <a:off x="7007744" y="4693245"/>
             <a:ext cx="1306594" cy="791611"/>
           </a:xfrm>
           <a:prstGeom prst="flowChartMultidocument">
@@ -7797,6 +8481,377 @@
                 <a:schemeClr val="tx1"/>
               </a:solidFill>
             </a:endParaRPr>
+          </a:p>
+        </p:txBody>
+      </p:sp>
+      <p:sp>
+        <p:nvSpPr>
+          <p:cNvPr id="10" name="TextBox 9">
+            <a:extLst>
+              <a:ext uri="{FF2B5EF4-FFF2-40B4-BE49-F238E27FC236}">
+                <a16:creationId xmlns:a16="http://schemas.microsoft.com/office/drawing/2014/main" id="{21244653-6439-4858-832D-A5EC08DF9924}"/>
+              </a:ext>
+            </a:extLst>
+          </p:cNvPr>
+          <p:cNvSpPr txBox="1"/>
+          <p:nvPr/>
+        </p:nvSpPr>
+        <p:spPr>
+          <a:xfrm>
+            <a:off x="668917" y="2786677"/>
+            <a:ext cx="6101778" cy="2631490"/>
+          </a:xfrm>
+          <a:prstGeom prst="rect">
+            <a:avLst/>
+          </a:prstGeom>
+          <a:solidFill>
+            <a:schemeClr val="bg1">
+              <a:lumMod val="95000"/>
+            </a:schemeClr>
+          </a:solidFill>
+        </p:spPr>
+        <p:txBody>
+          <a:bodyPr wrap="square" rtlCol="0">
+            <a:spAutoFit/>
+          </a:bodyPr>
+          <a:lstStyle/>
+          <a:p>
+            <a:r>
+              <a:rPr lang="en-GB" sz="1100" b="1" dirty="0">
+                <a:latin typeface="Courier New" panose="02070309020205020404" pitchFamily="49" charset="0"/>
+                <a:cs typeface="Courier New" panose="02070309020205020404" pitchFamily="49" charset="0"/>
+              </a:rPr>
+              <a:t>&lt;html </a:t>
+            </a:r>
+            <a:r>
+              <a:rPr lang="en-GB" sz="1100" b="1" dirty="0" err="1">
+                <a:latin typeface="Courier New" panose="02070309020205020404" pitchFamily="49" charset="0"/>
+                <a:cs typeface="Courier New" panose="02070309020205020404" pitchFamily="49" charset="0"/>
+              </a:rPr>
+              <a:t>xmlns</a:t>
+            </a:r>
+            <a:r>
+              <a:rPr lang="en-GB" sz="1100" b="1" dirty="0">
+                <a:latin typeface="Courier New" panose="02070309020205020404" pitchFamily="49" charset="0"/>
+                <a:cs typeface="Courier New" panose="02070309020205020404" pitchFamily="49" charset="0"/>
+              </a:rPr>
+              <a:t>="http://www.w3.org/1999/xhtml"&gt;</a:t>
+            </a:r>
+          </a:p>
+          <a:p>
+            <a:r>
+              <a:rPr lang="en-GB" sz="1100" b="1" dirty="0">
+                <a:latin typeface="Courier New" panose="02070309020205020404" pitchFamily="49" charset="0"/>
+                <a:cs typeface="Courier New" panose="02070309020205020404" pitchFamily="49" charset="0"/>
+              </a:rPr>
+              <a:t>  &lt;head&gt;</a:t>
+            </a:r>
+          </a:p>
+          <a:p>
+            <a:r>
+              <a:rPr lang="en-GB" sz="1100" b="1" dirty="0">
+                <a:latin typeface="Courier New" panose="02070309020205020404" pitchFamily="49" charset="0"/>
+                <a:cs typeface="Courier New" panose="02070309020205020404" pitchFamily="49" charset="0"/>
+              </a:rPr>
+              <a:t>    &lt;title&gt;XProc demo file&lt;/title&gt;</a:t>
+            </a:r>
+          </a:p>
+          <a:p>
+            <a:r>
+              <a:rPr lang="en-GB" sz="1100" b="1" dirty="0">
+                <a:latin typeface="Courier New" panose="02070309020205020404" pitchFamily="49" charset="0"/>
+                <a:cs typeface="Courier New" panose="02070309020205020404" pitchFamily="49" charset="0"/>
+              </a:rPr>
+              <a:t>  &lt;/head&gt;</a:t>
+            </a:r>
+          </a:p>
+          <a:p>
+            <a:r>
+              <a:rPr lang="en-GB" sz="1100" b="1" dirty="0">
+                <a:latin typeface="Courier New" panose="02070309020205020404" pitchFamily="49" charset="0"/>
+                <a:cs typeface="Courier New" panose="02070309020205020404" pitchFamily="49" charset="0"/>
+              </a:rPr>
+              <a:t>  &lt;body&gt;</a:t>
+            </a:r>
+          </a:p>
+          <a:p>
+            <a:r>
+              <a:rPr lang="en-GB" sz="1100" b="1" dirty="0">
+                <a:latin typeface="Courier New" panose="02070309020205020404" pitchFamily="49" charset="0"/>
+                <a:cs typeface="Courier New" panose="02070309020205020404" pitchFamily="49" charset="0"/>
+              </a:rPr>
+              <a:t>    &lt;p&gt;The old logo:&lt;/p&gt;</a:t>
+            </a:r>
+          </a:p>
+          <a:p>
+            <a:r>
+              <a:rPr lang="en-GB" sz="1100" b="1" dirty="0">
+                <a:latin typeface="Courier New" panose="02070309020205020404" pitchFamily="49" charset="0"/>
+                <a:cs typeface="Courier New" panose="02070309020205020404" pitchFamily="49" charset="0"/>
+              </a:rPr>
+              <a:t>    &lt;p&gt;</a:t>
+            </a:r>
+          </a:p>
+          <a:p>
+            <a:r>
+              <a:rPr lang="en-GB" sz="1100" b="1" dirty="0">
+                <a:latin typeface="Courier New" panose="02070309020205020404" pitchFamily="49" charset="0"/>
+                <a:cs typeface="Courier New" panose="02070309020205020404" pitchFamily="49" charset="0"/>
+              </a:rPr>
+              <a:t>      &lt;</a:t>
+            </a:r>
+            <a:r>
+              <a:rPr lang="en-GB" sz="1100" b="1" dirty="0" err="1">
+                <a:latin typeface="Courier New" panose="02070309020205020404" pitchFamily="49" charset="0"/>
+                <a:cs typeface="Courier New" panose="02070309020205020404" pitchFamily="49" charset="0"/>
+              </a:rPr>
+              <a:t>img</a:t>
+            </a:r>
+            <a:r>
+              <a:rPr lang="en-GB" sz="1100" b="1" dirty="0">
+                <a:latin typeface="Courier New" panose="02070309020205020404" pitchFamily="49" charset="0"/>
+                <a:cs typeface="Courier New" panose="02070309020205020404" pitchFamily="49" charset="0"/>
+              </a:rPr>
+              <a:t> </a:t>
+            </a:r>
+            <a:r>
+              <a:rPr lang="en-GB" sz="1100" b="1" dirty="0" err="1">
+                <a:latin typeface="Courier New" panose="02070309020205020404" pitchFamily="49" charset="0"/>
+                <a:cs typeface="Courier New" panose="02070309020205020404" pitchFamily="49" charset="0"/>
+              </a:rPr>
+              <a:t>src</a:t>
+            </a:r>
+            <a:r>
+              <a:rPr lang="en-GB" sz="1100" b="1" dirty="0">
+                <a:latin typeface="Courier New" panose="02070309020205020404" pitchFamily="49" charset="0"/>
+                <a:cs typeface="Courier New" panose="02070309020205020404" pitchFamily="49" charset="0"/>
+              </a:rPr>
+              <a:t>="</a:t>
+            </a:r>
+            <a:r>
+              <a:rPr lang="en-GB" sz="1100" b="1" dirty="0" err="1">
+                <a:latin typeface="Courier New" panose="02070309020205020404" pitchFamily="49" charset="0"/>
+                <a:cs typeface="Courier New" panose="02070309020205020404" pitchFamily="49" charset="0"/>
+              </a:rPr>
+              <a:t>img</a:t>
+            </a:r>
+            <a:r>
+              <a:rPr lang="en-GB" sz="1100" b="1" dirty="0">
+                <a:latin typeface="Courier New" panose="02070309020205020404" pitchFamily="49" charset="0"/>
+                <a:cs typeface="Courier New" panose="02070309020205020404" pitchFamily="49" charset="0"/>
+              </a:rPr>
+              <a:t>/old.png" alt="Old XProc logo" /&gt;</a:t>
+            </a:r>
+          </a:p>
+          <a:p>
+            <a:r>
+              <a:rPr lang="en-GB" sz="1100" b="1" dirty="0">
+                <a:latin typeface="Courier New" panose="02070309020205020404" pitchFamily="49" charset="0"/>
+                <a:cs typeface="Courier New" panose="02070309020205020404" pitchFamily="49" charset="0"/>
+              </a:rPr>
+              <a:t>    &lt;/p&gt;</a:t>
+            </a:r>
+          </a:p>
+          <a:p>
+            <a:r>
+              <a:rPr lang="en-GB" sz="1100" b="1" dirty="0">
+                <a:latin typeface="Courier New" panose="02070309020205020404" pitchFamily="49" charset="0"/>
+                <a:cs typeface="Courier New" panose="02070309020205020404" pitchFamily="49" charset="0"/>
+              </a:rPr>
+              <a:t>    &lt;p&gt;New logo:&lt;/p&gt;</a:t>
+            </a:r>
+          </a:p>
+          <a:p>
+            <a:r>
+              <a:rPr lang="en-GB" sz="1100" b="1" dirty="0">
+                <a:latin typeface="Courier New" panose="02070309020205020404" pitchFamily="49" charset="0"/>
+                <a:cs typeface="Courier New" panose="02070309020205020404" pitchFamily="49" charset="0"/>
+              </a:rPr>
+              <a:t>    &lt;p&gt;</a:t>
+            </a:r>
+          </a:p>
+          <a:p>
+            <a:r>
+              <a:rPr lang="en-GB" sz="1100" b="1" dirty="0">
+                <a:latin typeface="Courier New" panose="02070309020205020404" pitchFamily="49" charset="0"/>
+                <a:cs typeface="Courier New" panose="02070309020205020404" pitchFamily="49" charset="0"/>
+              </a:rPr>
+              <a:t>      &lt;</a:t>
+            </a:r>
+            <a:r>
+              <a:rPr lang="en-GB" sz="1100" b="1" dirty="0" err="1">
+                <a:latin typeface="Courier New" panose="02070309020205020404" pitchFamily="49" charset="0"/>
+                <a:cs typeface="Courier New" panose="02070309020205020404" pitchFamily="49" charset="0"/>
+              </a:rPr>
+              <a:t>img</a:t>
+            </a:r>
+            <a:r>
+              <a:rPr lang="en-GB" sz="1100" b="1" dirty="0">
+                <a:latin typeface="Courier New" panose="02070309020205020404" pitchFamily="49" charset="0"/>
+                <a:cs typeface="Courier New" panose="02070309020205020404" pitchFamily="49" charset="0"/>
+              </a:rPr>
+              <a:t> </a:t>
+            </a:r>
+            <a:r>
+              <a:rPr lang="en-GB" sz="1100" b="1" dirty="0" err="1">
+                <a:latin typeface="Courier New" panose="02070309020205020404" pitchFamily="49" charset="0"/>
+                <a:cs typeface="Courier New" panose="02070309020205020404" pitchFamily="49" charset="0"/>
+              </a:rPr>
+              <a:t>src</a:t>
+            </a:r>
+            <a:r>
+              <a:rPr lang="en-GB" sz="1100" b="1" dirty="0">
+                <a:latin typeface="Courier New" panose="02070309020205020404" pitchFamily="49" charset="0"/>
+                <a:cs typeface="Courier New" panose="02070309020205020404" pitchFamily="49" charset="0"/>
+              </a:rPr>
+              <a:t>="</a:t>
+            </a:r>
+            <a:r>
+              <a:rPr lang="en-GB" sz="1100" b="1" dirty="0" err="1">
+                <a:latin typeface="Courier New" panose="02070309020205020404" pitchFamily="49" charset="0"/>
+                <a:cs typeface="Courier New" panose="02070309020205020404" pitchFamily="49" charset="0"/>
+              </a:rPr>
+              <a:t>img</a:t>
+            </a:r>
+            <a:r>
+              <a:rPr lang="en-GB" sz="1100" b="1" dirty="0">
+                <a:latin typeface="Courier New" panose="02070309020205020404" pitchFamily="49" charset="0"/>
+                <a:cs typeface="Courier New" panose="02070309020205020404" pitchFamily="49" charset="0"/>
+              </a:rPr>
+              <a:t>/kanava.jpg" alt="New XProc logo" width="10%"/&gt;</a:t>
+            </a:r>
+          </a:p>
+          <a:p>
+            <a:r>
+              <a:rPr lang="en-GB" sz="1100" b="1" dirty="0">
+                <a:latin typeface="Courier New" panose="02070309020205020404" pitchFamily="49" charset="0"/>
+                <a:cs typeface="Courier New" panose="02070309020205020404" pitchFamily="49" charset="0"/>
+              </a:rPr>
+              <a:t>    &lt;/p&gt;</a:t>
+            </a:r>
+          </a:p>
+          <a:p>
+            <a:r>
+              <a:rPr lang="en-GB" sz="1100" b="1" dirty="0">
+                <a:latin typeface="Courier New" panose="02070309020205020404" pitchFamily="49" charset="0"/>
+                <a:cs typeface="Courier New" panose="02070309020205020404" pitchFamily="49" charset="0"/>
+              </a:rPr>
+              <a:t>  &lt;/body&gt;</a:t>
+            </a:r>
+          </a:p>
+          <a:p>
+            <a:r>
+              <a:rPr lang="en-GB" sz="1100" b="1" dirty="0">
+                <a:latin typeface="Courier New" panose="02070309020205020404" pitchFamily="49" charset="0"/>
+                <a:cs typeface="Courier New" panose="02070309020205020404" pitchFamily="49" charset="0"/>
+              </a:rPr>
+              <a:t>&lt;/html&gt;</a:t>
+            </a:r>
+          </a:p>
+        </p:txBody>
+      </p:sp>
+      <p:sp>
+        <p:nvSpPr>
+          <p:cNvPr id="11" name="Oval 10">
+            <a:extLst>
+              <a:ext uri="{FF2B5EF4-FFF2-40B4-BE49-F238E27FC236}">
+                <a16:creationId xmlns:a16="http://schemas.microsoft.com/office/drawing/2014/main" id="{BB1D8C66-6A0D-468C-B0EB-983E562D465B}"/>
+              </a:ext>
+            </a:extLst>
+          </p:cNvPr>
+          <p:cNvSpPr/>
+          <p:nvPr/>
+        </p:nvSpPr>
+        <p:spPr>
+          <a:xfrm>
+            <a:off x="635457" y="4110693"/>
+            <a:ext cx="5887418" cy="1113348"/>
+          </a:xfrm>
+          <a:prstGeom prst="ellipse">
+            <a:avLst/>
+          </a:prstGeom>
+          <a:solidFill>
+            <a:schemeClr val="accent2">
+              <a:alpha val="31000"/>
+            </a:schemeClr>
+          </a:solidFill>
+        </p:spPr>
+        <p:style>
+          <a:lnRef idx="2">
+            <a:schemeClr val="accent1">
+              <a:shade val="50000"/>
+            </a:schemeClr>
+          </a:lnRef>
+          <a:fillRef idx="1">
+            <a:schemeClr val="accent1"/>
+          </a:fillRef>
+          <a:effectRef idx="0">
+            <a:schemeClr val="accent1"/>
+          </a:effectRef>
+          <a:fontRef idx="minor">
+            <a:schemeClr val="lt1"/>
+          </a:fontRef>
+        </p:style>
+        <p:txBody>
+          <a:bodyPr rtlCol="0" anchor="ctr"/>
+          <a:lstStyle/>
+          <a:p>
+            <a:pPr algn="ctr"/>
+            <a:endParaRPr lang="en-GB"/>
+          </a:p>
+        </p:txBody>
+      </p:sp>
+      <p:sp>
+        <p:nvSpPr>
+          <p:cNvPr id="13" name="TextBox 12">
+            <a:extLst>
+              <a:ext uri="{FF2B5EF4-FFF2-40B4-BE49-F238E27FC236}">
+                <a16:creationId xmlns:a16="http://schemas.microsoft.com/office/drawing/2014/main" id="{49548880-BF87-4709-A08A-17F50E3B1A21}"/>
+              </a:ext>
+            </a:extLst>
+          </p:cNvPr>
+          <p:cNvSpPr txBox="1"/>
+          <p:nvPr/>
+        </p:nvSpPr>
+        <p:spPr>
+          <a:xfrm>
+            <a:off x="5746750" y="5741680"/>
+            <a:ext cx="5542744" cy="461665"/>
+          </a:xfrm>
+          <a:prstGeom prst="rect">
+            <a:avLst/>
+          </a:prstGeom>
+          <a:noFill/>
+        </p:spPr>
+        <p:txBody>
+          <a:bodyPr wrap="square" rtlCol="0">
+            <a:spAutoFit/>
+          </a:bodyPr>
+          <a:lstStyle/>
+          <a:p>
+            <a:r>
+              <a:rPr lang="en-US" sz="2400" dirty="0"/>
+              <a:t>No changes in  </a:t>
+            </a:r>
+            <a:r>
+              <a:rPr lang="en-US" sz="2400" b="1" dirty="0">
+                <a:latin typeface="Courier New" panose="02070309020205020404" pitchFamily="49" charset="0"/>
+                <a:cs typeface="Courier New" panose="02070309020205020404" pitchFamily="49" charset="0"/>
+              </a:rPr>
+              <a:t>base-</a:t>
+            </a:r>
+            <a:r>
+              <a:rPr lang="en-US" sz="2400" b="1" dirty="0" err="1">
+                <a:latin typeface="Courier New" panose="02070309020205020404" pitchFamily="49" charset="0"/>
+                <a:cs typeface="Courier New" panose="02070309020205020404" pitchFamily="49" charset="0"/>
+              </a:rPr>
+              <a:t>uri</a:t>
+            </a:r>
+            <a:r>
+              <a:rPr lang="en-US" sz="2400" dirty="0"/>
+              <a:t> properties!</a:t>
+            </a:r>
+            <a:endParaRPr lang="en-GB" sz="2400" dirty="0"/>
           </a:p>
         </p:txBody>
       </p:sp>
@@ -8706,13 +9761,30 @@
             </a:pPr>
             <a:r>
               <a:rPr lang="en-US" dirty="0"/>
-              <a:t>Match files on the source port with the files in the manifest, by base-</a:t>
-            </a:r>
-            <a:r>
-              <a:rPr lang="en-US" dirty="0" err="1"/>
+              <a:t>Match documents in the manifest with documents on the source port, by </a:t>
+            </a:r>
+            <a:r>
+              <a:rPr lang="en-US" sz="1600" b="1" dirty="0">
+                <a:latin typeface="Courier New" panose="02070309020205020404" pitchFamily="49" charset="0"/>
+                <a:cs typeface="Courier New" panose="02070309020205020404" pitchFamily="49" charset="0"/>
+              </a:rPr>
+              <a:t>base-</a:t>
+            </a:r>
+            <a:r>
+              <a:rPr lang="en-US" sz="1600" b="1" dirty="0" err="1">
+                <a:latin typeface="Courier New" panose="02070309020205020404" pitchFamily="49" charset="0"/>
+                <a:cs typeface="Courier New" panose="02070309020205020404" pitchFamily="49" charset="0"/>
+              </a:rPr>
               <a:t>uri</a:t>
             </a:r>
-            <a:endParaRPr lang="en-US" dirty="0"/>
+            <a:r>
+              <a:rPr lang="en-US" dirty="0"/>
+              <a:t> property</a:t>
+            </a:r>
+            <a:endParaRPr lang="en-US" sz="1600" b="1" dirty="0">
+              <a:latin typeface="Courier New" panose="02070309020205020404" pitchFamily="49" charset="0"/>
+              <a:cs typeface="Courier New" panose="02070309020205020404" pitchFamily="49" charset="0"/>
+            </a:endParaRPr>
           </a:p>
           <a:p>
             <a:pPr marL="285750" indent="-285750">
@@ -8721,13 +9793,26 @@
             </a:pPr>
             <a:r>
               <a:rPr lang="en-US" dirty="0"/>
-              <a:t>If not, try to load from URI in manifest @</a:t>
-            </a:r>
-            <a:r>
-              <a:rPr lang="en-US" dirty="0" err="1"/>
+              <a:t>If not, try to load from URI in manifest </a:t>
+            </a:r>
+            <a:r>
+              <a:rPr lang="en-US" sz="1600" b="1" dirty="0">
+                <a:latin typeface="Courier New" panose="02070309020205020404" pitchFamily="49" charset="0"/>
+                <a:cs typeface="Courier New" panose="02070309020205020404" pitchFamily="49" charset="0"/>
+              </a:rPr>
+              <a:t>@</a:t>
+            </a:r>
+            <a:r>
+              <a:rPr lang="en-US" sz="1600" b="1" dirty="0" err="1">
+                <a:latin typeface="Courier New" panose="02070309020205020404" pitchFamily="49" charset="0"/>
+                <a:cs typeface="Courier New" panose="02070309020205020404" pitchFamily="49" charset="0"/>
+              </a:rPr>
               <a:t>href</a:t>
             </a:r>
-            <a:endParaRPr lang="en-GB" dirty="0"/>
+            <a:endParaRPr lang="en-GB" sz="1600" b="1" dirty="0">
+              <a:latin typeface="Courier New" panose="02070309020205020404" pitchFamily="49" charset="0"/>
+              <a:cs typeface="Courier New" panose="02070309020205020404" pitchFamily="49" charset="0"/>
+            </a:endParaRPr>
           </a:p>
         </p:txBody>
       </p:sp>
@@ -9086,6 +10171,270 @@
   <p:clrMapOvr>
     <a:masterClrMapping/>
   </p:clrMapOvr>
+  <p:timing>
+    <p:tnLst>
+      <p:par>
+        <p:cTn id="1" dur="indefinite" restart="never" nodeType="tmRoot">
+          <p:childTnLst>
+            <p:seq concurrent="1" nextAc="seek">
+              <p:cTn id="2" dur="indefinite" nodeType="mainSeq">
+                <p:childTnLst>
+                  <p:par>
+                    <p:cTn id="3" fill="hold">
+                      <p:stCondLst>
+                        <p:cond delay="indefinite"/>
+                      </p:stCondLst>
+                      <p:childTnLst>
+                        <p:par>
+                          <p:cTn id="4" fill="hold">
+                            <p:stCondLst>
+                              <p:cond delay="0"/>
+                            </p:stCondLst>
+                            <p:childTnLst>
+                              <p:par>
+                                <p:cTn id="5" presetID="1" presetClass="entr" presetSubtype="0" fill="hold" grpId="0" nodeType="clickEffect">
+                                  <p:stCondLst>
+                                    <p:cond delay="0"/>
+                                  </p:stCondLst>
+                                  <p:childTnLst>
+                                    <p:set>
+                                      <p:cBhvr>
+                                        <p:cTn id="6" dur="1" fill="hold">
+                                          <p:stCondLst>
+                                            <p:cond delay="0"/>
+                                          </p:stCondLst>
+                                        </p:cTn>
+                                        <p:tgtEl>
+                                          <p:spTgt spid="10"/>
+                                        </p:tgtEl>
+                                        <p:attrNameLst>
+                                          <p:attrName>style.visibility</p:attrName>
+                                        </p:attrNameLst>
+                                      </p:cBhvr>
+                                      <p:to>
+                                        <p:strVal val="visible"/>
+                                      </p:to>
+                                    </p:set>
+                                  </p:childTnLst>
+                                </p:cTn>
+                              </p:par>
+                              <p:par>
+                                <p:cTn id="7" presetID="1" presetClass="entr" presetSubtype="0" fill="hold" grpId="0" nodeType="withEffect">
+                                  <p:stCondLst>
+                                    <p:cond delay="0"/>
+                                  </p:stCondLst>
+                                  <p:childTnLst>
+                                    <p:set>
+                                      <p:cBhvr>
+                                        <p:cTn id="8" dur="1" fill="hold">
+                                          <p:stCondLst>
+                                            <p:cond delay="0"/>
+                                          </p:stCondLst>
+                                        </p:cTn>
+                                        <p:tgtEl>
+                                          <p:spTgt spid="8"/>
+                                        </p:tgtEl>
+                                        <p:attrNameLst>
+                                          <p:attrName>style.visibility</p:attrName>
+                                        </p:attrNameLst>
+                                      </p:cBhvr>
+                                      <p:to>
+                                        <p:strVal val="visible"/>
+                                      </p:to>
+                                    </p:set>
+                                  </p:childTnLst>
+                                </p:cTn>
+                              </p:par>
+                              <p:par>
+                                <p:cTn id="9" presetID="1" presetClass="entr" presetSubtype="0" fill="hold" grpId="0" nodeType="withEffect">
+                                  <p:stCondLst>
+                                    <p:cond delay="0"/>
+                                  </p:stCondLst>
+                                  <p:childTnLst>
+                                    <p:set>
+                                      <p:cBhvr>
+                                        <p:cTn id="10" dur="1" fill="hold">
+                                          <p:stCondLst>
+                                            <p:cond delay="0"/>
+                                          </p:stCondLst>
+                                        </p:cTn>
+                                        <p:tgtEl>
+                                          <p:spTgt spid="11"/>
+                                        </p:tgtEl>
+                                        <p:attrNameLst>
+                                          <p:attrName>style.visibility</p:attrName>
+                                        </p:attrNameLst>
+                                      </p:cBhvr>
+                                      <p:to>
+                                        <p:strVal val="visible"/>
+                                      </p:to>
+                                    </p:set>
+                                  </p:childTnLst>
+                                </p:cTn>
+                              </p:par>
+                              <p:par>
+                                <p:cTn id="11" presetID="1" presetClass="entr" presetSubtype="0" fill="hold" grpId="0" nodeType="withEffect">
+                                  <p:stCondLst>
+                                    <p:cond delay="0"/>
+                                  </p:stCondLst>
+                                  <p:childTnLst>
+                                    <p:set>
+                                      <p:cBhvr>
+                                        <p:cTn id="12" dur="1" fill="hold">
+                                          <p:stCondLst>
+                                            <p:cond delay="0"/>
+                                          </p:stCondLst>
+                                        </p:cTn>
+                                        <p:tgtEl>
+                                          <p:spTgt spid="9"/>
+                                        </p:tgtEl>
+                                        <p:attrNameLst>
+                                          <p:attrName>style.visibility</p:attrName>
+                                        </p:attrNameLst>
+                                      </p:cBhvr>
+                                      <p:to>
+                                        <p:strVal val="visible"/>
+                                      </p:to>
+                                    </p:set>
+                                  </p:childTnLst>
+                                </p:cTn>
+                              </p:par>
+                              <p:par>
+                                <p:cTn id="13" presetID="1" presetClass="entr" presetSubtype="0" fill="hold" grpId="0" nodeType="withEffect">
+                                  <p:stCondLst>
+                                    <p:cond delay="0"/>
+                                  </p:stCondLst>
+                                  <p:childTnLst>
+                                    <p:set>
+                                      <p:cBhvr>
+                                        <p:cTn id="14" dur="1" fill="hold">
+                                          <p:stCondLst>
+                                            <p:cond delay="0"/>
+                                          </p:stCondLst>
+                                        </p:cTn>
+                                        <p:tgtEl>
+                                          <p:spTgt spid="6"/>
+                                        </p:tgtEl>
+                                        <p:attrNameLst>
+                                          <p:attrName>style.visibility</p:attrName>
+                                        </p:attrNameLst>
+                                      </p:cBhvr>
+                                      <p:to>
+                                        <p:strVal val="visible"/>
+                                      </p:to>
+                                    </p:set>
+                                  </p:childTnLst>
+                                </p:cTn>
+                              </p:par>
+                            </p:childTnLst>
+                          </p:cTn>
+                        </p:par>
+                      </p:childTnLst>
+                    </p:cTn>
+                  </p:par>
+                  <p:par>
+                    <p:cTn id="15" fill="hold">
+                      <p:stCondLst>
+                        <p:cond delay="indefinite"/>
+                      </p:stCondLst>
+                      <p:childTnLst>
+                        <p:par>
+                          <p:cTn id="16" fill="hold">
+                            <p:stCondLst>
+                              <p:cond delay="0"/>
+                            </p:stCondLst>
+                            <p:childTnLst>
+                              <p:par>
+                                <p:cTn id="17" presetID="1" presetClass="entr" presetSubtype="0" fill="hold" grpId="0" nodeType="clickEffect">
+                                  <p:stCondLst>
+                                    <p:cond delay="0"/>
+                                  </p:stCondLst>
+                                  <p:childTnLst>
+                                    <p:set>
+                                      <p:cBhvr>
+                                        <p:cTn id="18" dur="1" fill="hold">
+                                          <p:stCondLst>
+                                            <p:cond delay="0"/>
+                                          </p:stCondLst>
+                                        </p:cTn>
+                                        <p:tgtEl>
+                                          <p:spTgt spid="20"/>
+                                        </p:tgtEl>
+                                        <p:attrNameLst>
+                                          <p:attrName>style.visibility</p:attrName>
+                                        </p:attrNameLst>
+                                      </p:cBhvr>
+                                      <p:to>
+                                        <p:strVal val="visible"/>
+                                      </p:to>
+                                    </p:set>
+                                  </p:childTnLst>
+                                </p:cTn>
+                              </p:par>
+                              <p:par>
+                                <p:cTn id="19" presetID="1" presetClass="entr" presetSubtype="0" fill="hold" grpId="0" nodeType="withEffect">
+                                  <p:stCondLst>
+                                    <p:cond delay="0"/>
+                                  </p:stCondLst>
+                                  <p:childTnLst>
+                                    <p:set>
+                                      <p:cBhvr>
+                                        <p:cTn id="20" dur="1" fill="hold">
+                                          <p:stCondLst>
+                                            <p:cond delay="0"/>
+                                          </p:stCondLst>
+                                        </p:cTn>
+                                        <p:tgtEl>
+                                          <p:spTgt spid="21"/>
+                                        </p:tgtEl>
+                                        <p:attrNameLst>
+                                          <p:attrName>style.visibility</p:attrName>
+                                        </p:attrNameLst>
+                                      </p:cBhvr>
+                                      <p:to>
+                                        <p:strVal val="visible"/>
+                                      </p:to>
+                                    </p:set>
+                                  </p:childTnLst>
+                                </p:cTn>
+                              </p:par>
+                            </p:childTnLst>
+                          </p:cTn>
+                        </p:par>
+                      </p:childTnLst>
+                    </p:cTn>
+                  </p:par>
+                </p:childTnLst>
+              </p:cTn>
+              <p:prevCondLst>
+                <p:cond evt="onPrev" delay="0">
+                  <p:tgtEl>
+                    <p:sldTgt/>
+                  </p:tgtEl>
+                </p:cond>
+              </p:prevCondLst>
+              <p:nextCondLst>
+                <p:cond evt="onNext" delay="0">
+                  <p:tgtEl>
+                    <p:sldTgt/>
+                  </p:tgtEl>
+                </p:cond>
+              </p:nextCondLst>
+            </p:seq>
+          </p:childTnLst>
+        </p:cTn>
+      </p:par>
+    </p:tnLst>
+    <p:bldLst>
+      <p:bldP spid="8" grpId="0" animBg="1"/>
+      <p:bldP spid="9" grpId="0" animBg="1"/>
+      <p:bldP spid="10" grpId="0" animBg="1"/>
+      <p:bldP spid="11" grpId="0" animBg="1"/>
+      <p:bldP spid="6" grpId="0" animBg="1"/>
+      <p:bldP spid="20" grpId="0"/>
+      <p:bldP spid="21" grpId="0" animBg="1"/>
+    </p:bldLst>
+  </p:timing>
 </p:sld>
 </file>
 
@@ -9868,6 +11217,86 @@
           </a:p>
         </p:txBody>
       </p:sp>
+      <p:sp>
+        <p:nvSpPr>
+          <p:cNvPr id="19" name="TextBox 18">
+            <a:extLst>
+              <a:ext uri="{FF2B5EF4-FFF2-40B4-BE49-F238E27FC236}">
+                <a16:creationId xmlns:a16="http://schemas.microsoft.com/office/drawing/2014/main" id="{E21F637D-6232-404C-8354-BFC43476E18D}"/>
+              </a:ext>
+            </a:extLst>
+          </p:cNvPr>
+          <p:cNvSpPr txBox="1"/>
+          <p:nvPr/>
+        </p:nvSpPr>
+        <p:spPr>
+          <a:xfrm>
+            <a:off x="5170123" y="503204"/>
+            <a:ext cx="10016314" cy="707886"/>
+          </a:xfrm>
+          <a:prstGeom prst="rect">
+            <a:avLst/>
+          </a:prstGeom>
+          <a:noFill/>
+        </p:spPr>
+        <p:txBody>
+          <a:bodyPr wrap="square" rtlCol="0">
+            <a:spAutoFit/>
+          </a:bodyPr>
+          <a:lstStyle/>
+          <a:p>
+            <a:r>
+              <a:rPr lang="en-US" sz="2000" dirty="0"/>
+              <a:t>Source &amp; presentation: </a:t>
+            </a:r>
+          </a:p>
+          <a:p>
+            <a:r>
+              <a:rPr lang="en-GB" sz="2000" dirty="0">
+                <a:hlinkClick r:id="rId3"/>
+              </a:rPr>
+              <a:t>https://github.com/xatapult/working-with-zip-demo-prague-2020</a:t>
+            </a:r>
+            <a:endParaRPr lang="en-GB" sz="2000" dirty="0"/>
+          </a:p>
+        </p:txBody>
+      </p:sp>
+      <p:pic>
+        <p:nvPicPr>
+          <p:cNvPr id="4" name="Picture 3">
+            <a:extLst>
+              <a:ext uri="{FF2B5EF4-FFF2-40B4-BE49-F238E27FC236}">
+                <a16:creationId xmlns:a16="http://schemas.microsoft.com/office/drawing/2014/main" id="{015269DD-DBD9-43F5-AA39-76DED4989583}"/>
+              </a:ext>
+            </a:extLst>
+          </p:cNvPr>
+          <p:cNvPicPr>
+            <a:picLocks noChangeAspect="1"/>
+          </p:cNvPicPr>
+          <p:nvPr/>
+        </p:nvPicPr>
+        <p:blipFill>
+          <a:blip r:embed="rId4">
+            <a:extLst>
+              <a:ext uri="{28A0092B-C50C-407E-A947-70E740481C1C}">
+                <a14:useLocalDpi xmlns:a14="http://schemas.microsoft.com/office/drawing/2010/main" val="0"/>
+              </a:ext>
+            </a:extLst>
+          </a:blip>
+          <a:stretch>
+            <a:fillRect/>
+          </a:stretch>
+        </p:blipFill>
+        <p:spPr>
+          <a:xfrm>
+            <a:off x="10085162" y="6362402"/>
+            <a:ext cx="1317330" cy="406948"/>
+          </a:xfrm>
+          <a:prstGeom prst="rect">
+            <a:avLst/>
+          </a:prstGeom>
+        </p:spPr>
+      </p:pic>
     </p:spTree>
     <p:extLst>
       <p:ext uri="{BB962C8B-B14F-4D97-AF65-F5344CB8AC3E}">

</xml_diff>